<commit_message>
formatting changes to template
</commit_message>
<xml_diff>
--- a/templates/ddi-reference.pptx
+++ b/templates/ddi-reference.pptx
@@ -211,7 +211,7 @@
           <a:p>
             <a:fld id="{74BF1679-DE84-414C-9452-F29537D2B6A2}" type="datetimeFigureOut">
               <a:rPr lang="en-US" smtClean="0"/>
-              <a:t>2/25/25</a:t>
+              <a:t>3/7/25</a:t>
             </a:fld>
             <a:endParaRPr lang="en-US"/>
           </a:p>
@@ -1628,10 +1628,12 @@
           </a:xfrm>
         </p:spPr>
         <p:txBody>
-          <a:bodyPr anchor="b"/>
+          <a:bodyPr anchor="b">
+            <a:normAutofit/>
+          </a:bodyPr>
           <a:lstStyle>
             <a:lvl1pPr algn="ctr">
-              <a:defRPr sz="6000"/>
+              <a:defRPr sz="4200" baseline="0"/>
             </a:lvl1pPr>
           </a:lstStyle>
           <a:p>
@@ -1745,7 +1747,7 @@
             <a:fld id="{E7B434E2-64A9-4847-802F-0A4F8068BB5F}" type="datetimeFigureOut">
               <a:rPr lang="en-US" smtClean="0"/>
               <a:pPr algn="ctr"/>
-              <a:t>2/25/25</a:t>
+              <a:t>3/7/25</a:t>
             </a:fld>
             <a:endParaRPr lang="en-US" dirty="0"/>
           </a:p>
@@ -2021,10 +2023,21 @@
             <p:ph type="title"/>
           </p:nvPr>
         </p:nvSpPr>
-        <p:spPr/>
+        <p:spPr>
+          <a:xfrm>
+            <a:off x="838200" y="365126"/>
+            <a:ext cx="10515600" cy="1112630"/>
+          </a:xfrm>
+        </p:spPr>
         <p:txBody>
-          <a:bodyPr/>
-          <a:lstStyle/>
+          <a:bodyPr>
+            <a:normAutofit/>
+          </a:bodyPr>
+          <a:lstStyle>
+            <a:lvl1pPr>
+              <a:defRPr sz="3200" baseline="0"/>
+            </a:lvl1pPr>
+          </a:lstStyle>
           <a:p>
             <a:r>
               <a:rPr lang="en-US" dirty="0"/>
@@ -2052,7 +2065,17 @@
         <p:spPr/>
         <p:txBody>
           <a:bodyPr/>
-          <a:lstStyle/>
+          <a:lstStyle>
+            <a:lvl1pPr>
+              <a:defRPr sz="2400" baseline="0"/>
+            </a:lvl1pPr>
+            <a:lvl2pPr>
+              <a:defRPr sz="1800" baseline="0"/>
+            </a:lvl2pPr>
+            <a:lvl3pPr>
+              <a:defRPr sz="1400" baseline="0"/>
+            </a:lvl3pPr>
+          </a:lstStyle>
           <a:p>
             <a:pPr lvl="0"/>
             <a:r>
@@ -2072,20 +2095,6 @@
             <a:r>
               <a:rPr lang="en-US" dirty="0"/>
               <a:t>Third level</a:t>
-            </a:r>
-          </a:p>
-          <a:p>
-            <a:pPr lvl="3"/>
-            <a:r>
-              <a:rPr lang="en-US" dirty="0"/>
-              <a:t>Fourth level</a:t>
-            </a:r>
-          </a:p>
-          <a:p>
-            <a:pPr lvl="4"/>
-            <a:r>
-              <a:rPr lang="en-US" dirty="0"/>
-              <a:t>Fifth level</a:t>
             </a:r>
           </a:p>
         </p:txBody>
@@ -2190,10 +2199,12 @@
           </a:xfrm>
         </p:spPr>
         <p:txBody>
-          <a:bodyPr anchor="b"/>
+          <a:bodyPr anchor="b">
+            <a:normAutofit/>
+          </a:bodyPr>
           <a:lstStyle>
             <a:lvl1pPr>
-              <a:defRPr sz="6000"/>
+              <a:defRPr sz="4400" baseline="0"/>
             </a:lvl1pPr>
           </a:lstStyle>
           <a:p>
@@ -2323,7 +2334,7 @@
           <a:p>
             <a:pPr lvl="0"/>
             <a:r>
-              <a:rPr lang="en-US"/>
+              <a:rPr lang="en-US" dirty="0"/>
               <a:t>Click to edit Master text styles</a:t>
             </a:r>
           </a:p>
@@ -2424,11 +2435,17 @@
         </p:nvSpPr>
         <p:spPr/>
         <p:txBody>
-          <a:bodyPr/>
-          <a:lstStyle/>
-          <a:p>
-            <a:r>
-              <a:rPr lang="en-US"/>
+          <a:bodyPr>
+            <a:normAutofit/>
+          </a:bodyPr>
+          <a:lstStyle>
+            <a:lvl1pPr>
+              <a:defRPr sz="3200" baseline="0"/>
+            </a:lvl1pPr>
+          </a:lstStyle>
+          <a:p>
+            <a:r>
+              <a:rPr lang="en-US" dirty="0"/>
               <a:t>Click to edit Master title style</a:t>
             </a:r>
           </a:p>
@@ -2458,40 +2475,36 @@
         </p:spPr>
         <p:txBody>
           <a:bodyPr/>
-          <a:lstStyle/>
+          <a:lstStyle>
+            <a:lvl1pPr>
+              <a:defRPr sz="2400" baseline="0"/>
+            </a:lvl1pPr>
+            <a:lvl2pPr>
+              <a:defRPr sz="1800" baseline="0"/>
+            </a:lvl2pPr>
+            <a:lvl3pPr>
+              <a:defRPr sz="1400" baseline="0"/>
+            </a:lvl3pPr>
+          </a:lstStyle>
           <a:p>
             <a:pPr lvl="0"/>
             <a:r>
-              <a:rPr lang="en-US"/>
+              <a:rPr lang="en-US" dirty="0"/>
               <a:t>Click to edit Master text styles</a:t>
             </a:r>
           </a:p>
           <a:p>
             <a:pPr lvl="1"/>
             <a:r>
-              <a:rPr lang="en-US"/>
+              <a:rPr lang="en-US" dirty="0"/>
               <a:t>Second level</a:t>
             </a:r>
           </a:p>
           <a:p>
             <a:pPr lvl="2"/>
             <a:r>
-              <a:rPr lang="en-US"/>
+              <a:rPr lang="en-US" dirty="0"/>
               <a:t>Third level</a:t>
-            </a:r>
-          </a:p>
-          <a:p>
-            <a:pPr lvl="3"/>
-            <a:r>
-              <a:rPr lang="en-US"/>
-              <a:t>Fourth level</a:t>
-            </a:r>
-          </a:p>
-          <a:p>
-            <a:pPr lvl="4"/>
-            <a:r>
-              <a:rPr lang="en-US"/>
-              <a:t>Fifth level</a:t>
             </a:r>
           </a:p>
         </p:txBody>
@@ -2520,40 +2533,36 @@
         </p:spPr>
         <p:txBody>
           <a:bodyPr/>
-          <a:lstStyle/>
+          <a:lstStyle>
+            <a:lvl1pPr>
+              <a:defRPr sz="2400" baseline="0"/>
+            </a:lvl1pPr>
+            <a:lvl2pPr>
+              <a:defRPr sz="1800" baseline="0"/>
+            </a:lvl2pPr>
+            <a:lvl3pPr>
+              <a:defRPr sz="1400" baseline="0"/>
+            </a:lvl3pPr>
+          </a:lstStyle>
           <a:p>
             <a:pPr lvl="0"/>
             <a:r>
-              <a:rPr lang="en-US"/>
+              <a:rPr lang="en-US" dirty="0"/>
               <a:t>Click to edit Master text styles</a:t>
             </a:r>
           </a:p>
           <a:p>
             <a:pPr lvl="1"/>
             <a:r>
-              <a:rPr lang="en-US"/>
+              <a:rPr lang="en-US" dirty="0"/>
               <a:t>Second level</a:t>
             </a:r>
           </a:p>
           <a:p>
             <a:pPr lvl="2"/>
             <a:r>
-              <a:rPr lang="en-US"/>
+              <a:rPr lang="en-US" dirty="0"/>
               <a:t>Third level</a:t>
-            </a:r>
-          </a:p>
-          <a:p>
-            <a:pPr lvl="3"/>
-            <a:r>
-              <a:rPr lang="en-US"/>
-              <a:t>Fourth level</a:t>
-            </a:r>
-          </a:p>
-          <a:p>
-            <a:pPr lvl="4"/>
-            <a:r>
-              <a:rPr lang="en-US"/>
-              <a:t>Fifth level</a:t>
             </a:r>
           </a:p>
         </p:txBody>
@@ -2658,11 +2667,17 @@
           </a:xfrm>
         </p:spPr>
         <p:txBody>
-          <a:bodyPr/>
-          <a:lstStyle/>
-          <a:p>
-            <a:r>
-              <a:rPr lang="en-US"/>
+          <a:bodyPr>
+            <a:normAutofit/>
+          </a:bodyPr>
+          <a:lstStyle>
+            <a:lvl1pPr>
+              <a:defRPr sz="3200" baseline="0"/>
+            </a:lvl1pPr>
+          </a:lstStyle>
+          <a:p>
+            <a:r>
+              <a:rPr lang="en-US" dirty="0"/>
               <a:t>Click to edit Master title style</a:t>
             </a:r>
           </a:p>
@@ -2687,15 +2702,23 @@
         <p:spPr>
           <a:xfrm>
             <a:off x="839788" y="1681163"/>
-            <a:ext cx="5157787" cy="823912"/>
+            <a:ext cx="5157787" cy="654533"/>
           </a:xfrm>
         </p:spPr>
         <p:txBody>
-          <a:bodyPr anchor="b"/>
+          <a:bodyPr anchor="b">
+            <a:normAutofit/>
+          </a:bodyPr>
           <a:lstStyle>
-            <a:lvl1pPr marL="0" indent="0">
+            <a:lvl1pPr marL="0" indent="0" fontAlgn="ctr">
+              <a:lnSpc>
+                <a:spcPct val="100000"/>
+              </a:lnSpc>
+              <a:spcBef>
+                <a:spcPts val="0"/>
+              </a:spcBef>
               <a:buNone/>
-              <a:defRPr sz="2400" b="1"/>
+              <a:defRPr sz="2400" b="0" i="1" baseline="0"/>
             </a:lvl1pPr>
             <a:lvl2pPr marL="457200" indent="0">
               <a:buNone/>
@@ -2733,7 +2756,7 @@
           <a:p>
             <a:pPr lvl="0"/>
             <a:r>
-              <a:rPr lang="en-US"/>
+              <a:rPr lang="en-US" dirty="0"/>
               <a:t>Click to edit Master text styles</a:t>
             </a:r>
           </a:p>
@@ -2763,40 +2786,36 @@
         </p:spPr>
         <p:txBody>
           <a:bodyPr/>
-          <a:lstStyle/>
+          <a:lstStyle>
+            <a:lvl1pPr>
+              <a:defRPr sz="2400" baseline="0"/>
+            </a:lvl1pPr>
+            <a:lvl2pPr>
+              <a:defRPr sz="1800" baseline="0"/>
+            </a:lvl2pPr>
+            <a:lvl3pPr>
+              <a:defRPr sz="1400" baseline="0"/>
+            </a:lvl3pPr>
+          </a:lstStyle>
           <a:p>
             <a:pPr lvl="0"/>
             <a:r>
-              <a:rPr lang="en-US"/>
+              <a:rPr lang="en-US" dirty="0"/>
               <a:t>Click to edit Master text styles</a:t>
             </a:r>
           </a:p>
           <a:p>
             <a:pPr lvl="1"/>
             <a:r>
-              <a:rPr lang="en-US"/>
+              <a:rPr lang="en-US" dirty="0"/>
               <a:t>Second level</a:t>
             </a:r>
           </a:p>
           <a:p>
             <a:pPr lvl="2"/>
             <a:r>
-              <a:rPr lang="en-US"/>
+              <a:rPr lang="en-US" dirty="0"/>
               <a:t>Third level</a:t>
-            </a:r>
-          </a:p>
-          <a:p>
-            <a:pPr lvl="3"/>
-            <a:r>
-              <a:rPr lang="en-US"/>
-              <a:t>Fourth level</a:t>
-            </a:r>
-          </a:p>
-          <a:p>
-            <a:pPr lvl="4"/>
-            <a:r>
-              <a:rPr lang="en-US"/>
-              <a:t>Fifth level</a:t>
             </a:r>
           </a:p>
         </p:txBody>
@@ -2820,15 +2839,21 @@
         <p:spPr>
           <a:xfrm>
             <a:off x="6172200" y="1681163"/>
-            <a:ext cx="5183188" cy="823912"/>
+            <a:ext cx="5183188" cy="654533"/>
           </a:xfrm>
         </p:spPr>
         <p:txBody>
           <a:bodyPr anchor="b"/>
           <a:lstStyle>
-            <a:lvl1pPr marL="0" indent="0">
+            <a:lvl1pPr marL="0" indent="0" fontAlgn="ctr">
+              <a:lnSpc>
+                <a:spcPct val="100000"/>
+              </a:lnSpc>
+              <a:spcBef>
+                <a:spcPts val="0"/>
+              </a:spcBef>
               <a:buNone/>
-              <a:defRPr sz="2400" b="1"/>
+              <a:defRPr sz="2400" b="0" i="1" baseline="0"/>
             </a:lvl1pPr>
             <a:lvl2pPr marL="457200" indent="0">
               <a:buNone/>
@@ -2866,7 +2891,7 @@
           <a:p>
             <a:pPr lvl="0"/>
             <a:r>
-              <a:rPr lang="en-US"/>
+              <a:rPr lang="en-US" dirty="0"/>
               <a:t>Click to edit Master text styles</a:t>
             </a:r>
           </a:p>
@@ -2896,40 +2921,36 @@
         </p:spPr>
         <p:txBody>
           <a:bodyPr/>
-          <a:lstStyle/>
+          <a:lstStyle>
+            <a:lvl1pPr>
+              <a:defRPr sz="2400" baseline="0"/>
+            </a:lvl1pPr>
+            <a:lvl2pPr>
+              <a:defRPr sz="1800" baseline="0"/>
+            </a:lvl2pPr>
+            <a:lvl3pPr>
+              <a:defRPr sz="1400" baseline="0"/>
+            </a:lvl3pPr>
+          </a:lstStyle>
           <a:p>
             <a:pPr lvl="0"/>
             <a:r>
-              <a:rPr lang="en-US"/>
+              <a:rPr lang="en-US" dirty="0"/>
               <a:t>Click to edit Master text styles</a:t>
             </a:r>
           </a:p>
           <a:p>
             <a:pPr lvl="1"/>
             <a:r>
-              <a:rPr lang="en-US"/>
+              <a:rPr lang="en-US" dirty="0"/>
               <a:t>Second level</a:t>
             </a:r>
           </a:p>
           <a:p>
             <a:pPr lvl="2"/>
             <a:r>
-              <a:rPr lang="en-US"/>
+              <a:rPr lang="en-US" dirty="0"/>
               <a:t>Third level</a:t>
-            </a:r>
-          </a:p>
-          <a:p>
-            <a:pPr lvl="3"/>
-            <a:r>
-              <a:rPr lang="en-US"/>
-              <a:t>Fourth level</a:t>
-            </a:r>
-          </a:p>
-          <a:p>
-            <a:pPr lvl="4"/>
-            <a:r>
-              <a:rPr lang="en-US"/>
-              <a:t>Fifth level</a:t>
             </a:r>
           </a:p>
         </p:txBody>
@@ -2981,6 +3002,45 @@
           </a:extLst>
         </p:spPr>
       </p:pic>
+      <p:cxnSp>
+        <p:nvCxnSpPr>
+          <p:cNvPr id="8" name="Straight Connector 7">
+            <a:extLst>
+              <a:ext uri="{FF2B5EF4-FFF2-40B4-BE49-F238E27FC236}">
+                <a16:creationId xmlns:a16="http://schemas.microsoft.com/office/drawing/2014/main" id="{06E98799-9CA1-23F5-3AFB-6FBC037D4BC5}"/>
+              </a:ext>
+            </a:extLst>
+          </p:cNvPr>
+          <p:cNvCxnSpPr>
+            <a:cxnSpLocks/>
+          </p:cNvCxnSpPr>
+          <p:nvPr userDrawn="1"/>
+        </p:nvCxnSpPr>
+        <p:spPr>
+          <a:xfrm>
+            <a:off x="6096000" y="2505075"/>
+            <a:ext cx="0" cy="3684588"/>
+          </a:xfrm>
+          <a:prstGeom prst="line">
+            <a:avLst/>
+          </a:prstGeom>
+          <a:ln w="28575"/>
+        </p:spPr>
+        <p:style>
+          <a:lnRef idx="1">
+            <a:schemeClr val="accent1"/>
+          </a:lnRef>
+          <a:fillRef idx="0">
+            <a:schemeClr val="accent1"/>
+          </a:fillRef>
+          <a:effectRef idx="0">
+            <a:schemeClr val="accent1"/>
+          </a:effectRef>
+          <a:fontRef idx="minor">
+            <a:schemeClr val="tx1"/>
+          </a:fontRef>
+        </p:style>
+      </p:cxnSp>
     </p:spTree>
     <p:extLst>
       <p:ext uri="{BB962C8B-B14F-4D97-AF65-F5344CB8AC3E}">
@@ -3029,11 +3089,17 @@
         </p:nvSpPr>
         <p:spPr/>
         <p:txBody>
-          <a:bodyPr/>
-          <a:lstStyle/>
-          <a:p>
-            <a:r>
-              <a:rPr lang="en-US"/>
+          <a:bodyPr>
+            <a:normAutofit/>
+          </a:bodyPr>
+          <a:lstStyle>
+            <a:lvl1pPr>
+              <a:defRPr sz="3200" baseline="0"/>
+            </a:lvl1pPr>
+          </a:lstStyle>
+          <a:p>
+            <a:r>
+              <a:rPr lang="en-US" dirty="0"/>
               <a:t>Click to edit Master title style</a:t>
             </a:r>
           </a:p>
@@ -3256,13 +3322,13 @@
           <a:bodyPr/>
           <a:lstStyle>
             <a:lvl1pPr>
-              <a:defRPr sz="3200"/>
+              <a:defRPr sz="2400" baseline="0"/>
             </a:lvl1pPr>
             <a:lvl2pPr>
-              <a:defRPr sz="2800"/>
+              <a:defRPr sz="1800" baseline="0"/>
             </a:lvl2pPr>
             <a:lvl3pPr>
-              <a:defRPr sz="2400"/>
+              <a:defRPr sz="1400" baseline="0"/>
             </a:lvl3pPr>
             <a:lvl4pPr>
               <a:defRPr sz="2000"/>
@@ -3304,20 +3370,6 @@
               <a:t>Third level</a:t>
             </a:r>
           </a:p>
-          <a:p>
-            <a:pPr lvl="3"/>
-            <a:r>
-              <a:rPr lang="en-US" dirty="0"/>
-              <a:t>Fourth level</a:t>
-            </a:r>
-          </a:p>
-          <a:p>
-            <a:pPr lvl="4"/>
-            <a:r>
-              <a:rPr lang="en-US" dirty="0"/>
-              <a:t>Fifth level</a:t>
-            </a:r>
-          </a:p>
         </p:txBody>
       </p:sp>
       <p:sp>
@@ -3338,8 +3390,8 @@
         </p:nvSpPr>
         <p:spPr>
           <a:xfrm>
-            <a:off x="839788" y="2057400"/>
-            <a:ext cx="3932237" cy="3811588"/>
+            <a:off x="839788" y="2514600"/>
+            <a:ext cx="3932237" cy="3354388"/>
           </a:xfrm>
         </p:spPr>
         <p:txBody>
@@ -3499,7 +3551,7 @@
           </a:lstStyle>
           <a:p>
             <a:r>
-              <a:rPr lang="en-US"/>
+              <a:rPr lang="en-US" dirty="0"/>
               <a:t>Click to edit Master title style</a:t>
             </a:r>
           </a:p>
@@ -3859,8 +3911,8 @@
         </p:blipFill>
         <p:spPr bwMode="auto">
           <a:xfrm>
-            <a:off x="328004" y="6052930"/>
-            <a:ext cx="1750466" cy="620920"/>
+            <a:off x="328004" y="6152068"/>
+            <a:ext cx="1470979" cy="521781"/>
           </a:xfrm>
           <a:prstGeom prst="rect">
             <a:avLst/>
@@ -11030,7 +11082,12 @@
             <p:ph idx="1"/>
           </p:nvPr>
         </p:nvSpPr>
-        <p:spPr/>
+        <p:spPr>
+          <a:xfrm>
+            <a:off x="838200" y="1690688"/>
+            <a:ext cx="10515600" cy="4351338"/>
+          </a:xfrm>
+        </p:spPr>
         <p:txBody>
           <a:bodyPr/>
           <a:lstStyle/>
@@ -11240,12 +11297,7 @@
             <p:ph type="title"/>
           </p:nvPr>
         </p:nvSpPr>
-        <p:spPr>
-          <a:xfrm>
-            <a:off x="838200" y="365125"/>
-            <a:ext cx="10515600" cy="665775"/>
-          </a:xfrm>
-        </p:spPr>
+        <p:spPr/>
         <p:txBody>
           <a:bodyPr anchor="t">
             <a:normAutofit/>
@@ -11257,6 +11309,31 @@
               <a:t>DDI Question Item – the Reusable Parts of the Question</a:t>
             </a:r>
             <a:endParaRPr lang="en-US" sz="3200" dirty="0"/>
+          </a:p>
+        </p:txBody>
+      </p:sp>
+      <p:sp>
+        <p:nvSpPr>
+          <p:cNvPr id="3" name="Content Placeholder 2">
+            <a:extLst>
+              <a:ext uri="{FF2B5EF4-FFF2-40B4-BE49-F238E27FC236}">
+                <a16:creationId xmlns:a16="http://schemas.microsoft.com/office/drawing/2014/main" id="{D21E43BF-F82C-E7A3-E9C8-633F865B1021}"/>
+              </a:ext>
+            </a:extLst>
+          </p:cNvPr>
+          <p:cNvSpPr>
+            <a:spLocks noGrp="1"/>
+          </p:cNvSpPr>
+          <p:nvPr>
+            <p:ph idx="1"/>
+          </p:nvPr>
+        </p:nvSpPr>
+        <p:spPr/>
+        <p:txBody>
+          <a:bodyPr/>
+          <a:lstStyle/>
+          <a:p>
+            <a:endParaRPr lang="en-US" dirty="0"/>
           </a:p>
         </p:txBody>
       </p:sp>
@@ -11274,8 +11351,8 @@
         </p:nvGrpSpPr>
         <p:grpSpPr>
           <a:xfrm>
-            <a:off x="1819962" y="1030900"/>
-            <a:ext cx="8552076" cy="5250536"/>
+            <a:off x="1124224" y="1653984"/>
+            <a:ext cx="6618359" cy="4063333"/>
             <a:chOff x="823244" y="1211207"/>
             <a:chExt cx="8069236" cy="4954097"/>
           </a:xfrm>
@@ -11902,7 +11979,7 @@
         <p:spPr/>
         <p:txBody>
           <a:bodyPr>
-            <a:normAutofit lnSpcReduction="10000"/>
+            <a:normAutofit/>
           </a:bodyPr>
           <a:lstStyle/>
           <a:p>

</xml_diff>